<commit_message>
Sync non localizable files for core commit d3f0adab52ed8e44a6097c5079396d1e9c06e0a7
</commit_message>
<xml_diff>
--- a/help/using/audience/assets/audiences-process.pptx
+++ b/help/using/audience/assets/audiences-process.pptx
@@ -104,6 +104,11 @@
       </a:defRPr>
     </a:lvl9pPr>
   </p:defaultTextStyle>
+  <p:extLst>
+    <p:ext uri="{EFAFB233-063F-42B5-8137-9DF3F51BA10A}">
+      <p15:sldGuideLst xmlns:p15="http://schemas.microsoft.com/office/powerpoint/2012/main"/>
+    </p:ext>
+  </p:extLst>
 </p:presentation>
 </file>
 
@@ -256,7 +261,7 @@
           <a:p>
             <a:fld id="{593BFBDD-65FC-BE45-BF64-8FFEF62A4ACC}" type="datetimeFigureOut">
               <a:rPr lang="en-FR" smtClean="0"/>
-              <a:t>01/02/2023</a:t>
+              <a:t>02/08/2023</a:t>
             </a:fld>
             <a:endParaRPr lang="en-FR"/>
           </a:p>
@@ -456,7 +461,7 @@
           <a:p>
             <a:fld id="{593BFBDD-65FC-BE45-BF64-8FFEF62A4ACC}" type="datetimeFigureOut">
               <a:rPr lang="en-FR" smtClean="0"/>
-              <a:t>01/02/2023</a:t>
+              <a:t>02/08/2023</a:t>
             </a:fld>
             <a:endParaRPr lang="en-FR"/>
           </a:p>
@@ -666,7 +671,7 @@
           <a:p>
             <a:fld id="{593BFBDD-65FC-BE45-BF64-8FFEF62A4ACC}" type="datetimeFigureOut">
               <a:rPr lang="en-FR" smtClean="0"/>
-              <a:t>01/02/2023</a:t>
+              <a:t>02/08/2023</a:t>
             </a:fld>
             <a:endParaRPr lang="en-FR"/>
           </a:p>
@@ -866,7 +871,7 @@
           <a:p>
             <a:fld id="{593BFBDD-65FC-BE45-BF64-8FFEF62A4ACC}" type="datetimeFigureOut">
               <a:rPr lang="en-FR" smtClean="0"/>
-              <a:t>01/02/2023</a:t>
+              <a:t>02/08/2023</a:t>
             </a:fld>
             <a:endParaRPr lang="en-FR"/>
           </a:p>
@@ -1142,7 +1147,7 @@
           <a:p>
             <a:fld id="{593BFBDD-65FC-BE45-BF64-8FFEF62A4ACC}" type="datetimeFigureOut">
               <a:rPr lang="en-FR" smtClean="0"/>
-              <a:t>01/02/2023</a:t>
+              <a:t>02/08/2023</a:t>
             </a:fld>
             <a:endParaRPr lang="en-FR"/>
           </a:p>
@@ -1410,7 +1415,7 @@
           <a:p>
             <a:fld id="{593BFBDD-65FC-BE45-BF64-8FFEF62A4ACC}" type="datetimeFigureOut">
               <a:rPr lang="en-FR" smtClean="0"/>
-              <a:t>01/02/2023</a:t>
+              <a:t>02/08/2023</a:t>
             </a:fld>
             <a:endParaRPr lang="en-FR"/>
           </a:p>
@@ -1825,7 +1830,7 @@
           <a:p>
             <a:fld id="{593BFBDD-65FC-BE45-BF64-8FFEF62A4ACC}" type="datetimeFigureOut">
               <a:rPr lang="en-FR" smtClean="0"/>
-              <a:t>01/02/2023</a:t>
+              <a:t>02/08/2023</a:t>
             </a:fld>
             <a:endParaRPr lang="en-FR"/>
           </a:p>
@@ -1967,7 +1972,7 @@
           <a:p>
             <a:fld id="{593BFBDD-65FC-BE45-BF64-8FFEF62A4ACC}" type="datetimeFigureOut">
               <a:rPr lang="en-FR" smtClean="0"/>
-              <a:t>01/02/2023</a:t>
+              <a:t>02/08/2023</a:t>
             </a:fld>
             <a:endParaRPr lang="en-FR"/>
           </a:p>
@@ -2080,7 +2085,7 @@
           <a:p>
             <a:fld id="{593BFBDD-65FC-BE45-BF64-8FFEF62A4ACC}" type="datetimeFigureOut">
               <a:rPr lang="en-FR" smtClean="0"/>
-              <a:t>01/02/2023</a:t>
+              <a:t>02/08/2023</a:t>
             </a:fld>
             <a:endParaRPr lang="en-FR"/>
           </a:p>
@@ -2393,7 +2398,7 @@
           <a:p>
             <a:fld id="{593BFBDD-65FC-BE45-BF64-8FFEF62A4ACC}" type="datetimeFigureOut">
               <a:rPr lang="en-FR" smtClean="0"/>
-              <a:t>01/02/2023</a:t>
+              <a:t>02/08/2023</a:t>
             </a:fld>
             <a:endParaRPr lang="en-FR"/>
           </a:p>
@@ -2682,7 +2687,7 @@
           <a:p>
             <a:fld id="{593BFBDD-65FC-BE45-BF64-8FFEF62A4ACC}" type="datetimeFigureOut">
               <a:rPr lang="en-FR" smtClean="0"/>
-              <a:t>01/02/2023</a:t>
+              <a:t>02/08/2023</a:t>
             </a:fld>
             <a:endParaRPr lang="en-FR"/>
           </a:p>
@@ -2925,7 +2930,7 @@
           <a:p>
             <a:fld id="{593BFBDD-65FC-BE45-BF64-8FFEF62A4ACC}" type="datetimeFigureOut">
               <a:rPr lang="en-FR" smtClean="0"/>
-              <a:t>01/02/2023</a:t>
+              <a:t>02/08/2023</a:t>
             </a:fld>
             <a:endParaRPr lang="en-FR"/>
           </a:p>
@@ -3657,7 +3662,7 @@
         <p:spPr>
           <a:xfrm>
             <a:off x="8119323" y="2799949"/>
-            <a:ext cx="1819807" cy="584775"/>
+            <a:ext cx="2238214" cy="584775"/>
           </a:xfrm>
           <a:prstGeom prst="rect">
             <a:avLst/>
@@ -3677,7 +3682,7 @@
                 </a:solidFill>
                 <a:latin typeface="Adobe Clean" panose="020B0503020404020204" pitchFamily="34" charset="0"/>
               </a:rPr>
-              <a:t>Target audience(s) in campaigns</a:t>
+              <a:t>Target audience(s) in campaigns and journeys</a:t>
             </a:r>
           </a:p>
         </p:txBody>

</xml_diff>